<commit_message>
Fixing Divine Guiding Principle
</commit_message>
<xml_diff>
--- a/WebContent/WEB-INF/divineCodeOfConduct.pptx
+++ b/WebContent/WEB-INF/divineCodeOfConduct.pptx
@@ -192,7 +192,7 @@
           <a:p>
             <a:fld id="{661244D2-2065-4847-8C74-B75063B4EBF4}" type="datetimeFigureOut">
               <a:rPr lang="en-US" smtClean="0"/>
-              <a:t>4/30/15</a:t>
+              <a:t>22/07/16</a:t>
             </a:fld>
             <a:endParaRPr lang="en-US"/>
           </a:p>
@@ -744,7 +744,7 @@
           <a:p>
             <a:fld id="{6A115894-3261-314E-BEB5-F3A46CF27325}" type="datetimeFigureOut">
               <a:rPr lang="en-US" smtClean="0"/>
-              <a:t>4/30/15</a:t>
+              <a:t>22/07/16</a:t>
             </a:fld>
             <a:endParaRPr lang="en-US"/>
           </a:p>
@@ -914,7 +914,7 @@
           <a:p>
             <a:fld id="{6A115894-3261-314E-BEB5-F3A46CF27325}" type="datetimeFigureOut">
               <a:rPr lang="en-US" smtClean="0"/>
-              <a:t>4/30/15</a:t>
+              <a:t>22/07/16</a:t>
             </a:fld>
             <a:endParaRPr lang="en-US"/>
           </a:p>
@@ -1094,7 +1094,7 @@
           <a:p>
             <a:fld id="{6A115894-3261-314E-BEB5-F3A46CF27325}" type="datetimeFigureOut">
               <a:rPr lang="en-US" smtClean="0"/>
-              <a:t>4/30/15</a:t>
+              <a:t>22/07/16</a:t>
             </a:fld>
             <a:endParaRPr lang="en-US"/>
           </a:p>
@@ -1320,7 +1320,7 @@
           <a:p>
             <a:fld id="{6A115894-3261-314E-BEB5-F3A46CF27325}" type="datetimeFigureOut">
               <a:rPr lang="en-US" smtClean="0"/>
-              <a:t>4/30/15</a:t>
+              <a:t>22/07/16</a:t>
             </a:fld>
             <a:endParaRPr lang="en-US"/>
           </a:p>
@@ -1566,7 +1566,7 @@
           <a:p>
             <a:fld id="{6A115894-3261-314E-BEB5-F3A46CF27325}" type="datetimeFigureOut">
               <a:rPr lang="en-US" smtClean="0"/>
-              <a:t>4/30/15</a:t>
+              <a:t>22/07/16</a:t>
             </a:fld>
             <a:endParaRPr lang="en-US"/>
           </a:p>
@@ -1854,7 +1854,7 @@
           <a:p>
             <a:fld id="{6A115894-3261-314E-BEB5-F3A46CF27325}" type="datetimeFigureOut">
               <a:rPr lang="en-US" smtClean="0"/>
-              <a:t>4/30/15</a:t>
+              <a:t>22/07/16</a:t>
             </a:fld>
             <a:endParaRPr lang="en-US"/>
           </a:p>
@@ -2276,7 +2276,7 @@
           <a:p>
             <a:fld id="{6A115894-3261-314E-BEB5-F3A46CF27325}" type="datetimeFigureOut">
               <a:rPr lang="en-US" smtClean="0"/>
-              <a:t>4/30/15</a:t>
+              <a:t>22/07/16</a:t>
             </a:fld>
             <a:endParaRPr lang="en-US"/>
           </a:p>
@@ -2394,7 +2394,7 @@
           <a:p>
             <a:fld id="{6A115894-3261-314E-BEB5-F3A46CF27325}" type="datetimeFigureOut">
               <a:rPr lang="en-US" smtClean="0"/>
-              <a:t>4/30/15</a:t>
+              <a:t>22/07/16</a:t>
             </a:fld>
             <a:endParaRPr lang="en-US"/>
           </a:p>
@@ -2489,7 +2489,7 @@
           <a:p>
             <a:fld id="{6A115894-3261-314E-BEB5-F3A46CF27325}" type="datetimeFigureOut">
               <a:rPr lang="en-US" smtClean="0"/>
-              <a:t>4/30/15</a:t>
+              <a:t>22/07/16</a:t>
             </a:fld>
             <a:endParaRPr lang="en-US"/>
           </a:p>
@@ -2766,7 +2766,7 @@
           <a:p>
             <a:fld id="{6A115894-3261-314E-BEB5-F3A46CF27325}" type="datetimeFigureOut">
               <a:rPr lang="en-US" smtClean="0"/>
-              <a:t>4/30/15</a:t>
+              <a:t>22/07/16</a:t>
             </a:fld>
             <a:endParaRPr lang="en-US"/>
           </a:p>
@@ -3019,7 +3019,7 @@
           <a:p>
             <a:fld id="{6A115894-3261-314E-BEB5-F3A46CF27325}" type="datetimeFigureOut">
               <a:rPr lang="en-US" smtClean="0"/>
-              <a:t>4/30/15</a:t>
+              <a:t>22/07/16</a:t>
             </a:fld>
             <a:endParaRPr lang="en-US"/>
           </a:p>
@@ -3232,7 +3232,7 @@
           <a:p>
             <a:fld id="{6A115894-3261-314E-BEB5-F3A46CF27325}" type="datetimeFigureOut">
               <a:rPr lang="en-US" smtClean="0"/>
-              <a:t>4/30/15</a:t>
+              <a:t>22/07/16</a:t>
             </a:fld>
             <a:endParaRPr lang="en-US"/>
           </a:p>
@@ -3656,7 +3656,18 @@
                 <a:ea typeface="ＭＳ Ｐゴシック" charset="0"/>
                 <a:cs typeface="Andalus" pitchFamily="2" charset="-78"/>
               </a:rPr>
-              <a:t>Divine Code of Conduct</a:t>
+              <a:t>Divine </a:t>
+            </a:r>
+            <a:r>
+              <a:rPr lang="en-US" sz="2800" b="1" dirty="0" smtClean="0">
+                <a:solidFill>
+                  <a:srgbClr val="002060"/>
+                </a:solidFill>
+                <a:latin typeface="+mn-lt"/>
+                <a:ea typeface="ＭＳ Ｐゴシック" charset="0"/>
+                <a:cs typeface="Andalus" pitchFamily="2" charset="-78"/>
+              </a:rPr>
+              <a:t>Guiding Principle</a:t>
             </a:r>
             <a:endParaRPr lang="en-US" sz="3200" b="1" dirty="0">
               <a:solidFill>

</xml_diff>